<commit_message>
neutralized Master format added license logo (CC-By SA)
</commit_message>
<xml_diff>
--- a/de.tudarmstadt.ukp.dkpro.tutorial/trunk/slides/dkproIntroCore.pptx
+++ b/de.tudarmstadt.ukp.dkpro.tutorial/trunk/slides/dkproIntroCore.pptx
@@ -264,7 +264,7 @@
               <a:pPr>
                 <a:defRPr/>
               </a:pPr>
-              <a:t>05.06.2013</a:t>
+              <a:t>26.08.2013</a:t>
             </a:fld>
             <a:endParaRPr lang="de-DE"/>
           </a:p>
@@ -1518,7 +1518,7 @@
                 </a:solidFill>
               </a:rPr>
               <a:pPr eaLnBrk="1" hangingPunct="1"/>
-              <a:t>05.06.2013</a:t>
+              <a:t>26.08.2013</a:t>
             </a:fld>
             <a:endParaRPr lang="de-DE" sz="1200" smtClean="0">
               <a:solidFill>
@@ -2184,7 +2184,7 @@
                 </a:solidFill>
               </a:rPr>
               <a:pPr eaLnBrk="1" hangingPunct="1"/>
-              <a:t>05.06.2013</a:t>
+              <a:t>26.08.2013</a:t>
             </a:fld>
             <a:endParaRPr lang="de-DE" sz="1200" smtClean="0">
               <a:solidFill>
@@ -4247,7 +4247,7 @@
             </a:pPr>
             <a:r>
               <a:rPr lang="de-DE" smtClean="0"/>
-              <a:t>29.05.2013 | PhD Program KDSL | Dr. J. Eckle-Kohler, R. Eckart de Castilho, R. Kluge, Dr. T. Zesch</a:t>
+              <a:t>29.05.2013 | Dr. J. Eckle-Kohler, R. Eckart de Castilho, R. Kluge, Dr. T. Zesch</a:t>
             </a:r>
             <a:endParaRPr lang="de-DE"/>
           </a:p>
@@ -4517,7 +4517,7 @@
             </a:pPr>
             <a:r>
               <a:rPr lang="de-DE" smtClean="0"/>
-              <a:t>29.05.2013 | PhD Program KDSL | Dr. J. Eckle-Kohler, R. Eckart de Castilho, R. Kluge, Dr. T. Zesch</a:t>
+              <a:t>29.05.2013 | Dr. J. Eckle-Kohler, R. Eckart de Castilho, R. Kluge, Dr. T. Zesch</a:t>
             </a:r>
             <a:endParaRPr lang="de-DE"/>
           </a:p>
@@ -5140,7 +5140,7 @@
           </a:lstStyle>
           <a:p>
             <a:r>
-              <a:rPr lang="de-DE" dirty="0" smtClean="0">
+              <a:rPr lang="de-DE" smtClean="0">
                 <a:solidFill>
                   <a:prstClr val="black">
                     <a:lumMod val="75000"/>
@@ -5148,84 +5148,7 @@
                   </a:prstClr>
                 </a:solidFill>
               </a:rPr>
-              <a:t>29.05.2013 | </a:t>
-            </a:r>
-            <a:r>
-              <a:rPr lang="de-DE" dirty="0" err="1" smtClean="0">
-                <a:solidFill>
-                  <a:prstClr val="black">
-                    <a:lumMod val="75000"/>
-                    <a:lumOff val="25000"/>
-                  </a:prstClr>
-                </a:solidFill>
-              </a:rPr>
-              <a:t>PhD</a:t>
-            </a:r>
-            <a:r>
-              <a:rPr lang="de-DE" dirty="0" smtClean="0">
-                <a:solidFill>
-                  <a:prstClr val="black">
-                    <a:lumMod val="75000"/>
-                    <a:lumOff val="25000"/>
-                  </a:prstClr>
-                </a:solidFill>
-              </a:rPr>
-              <a:t> </a:t>
-            </a:r>
-            <a:r>
-              <a:rPr lang="de-DE" dirty="0" err="1" smtClean="0">
-                <a:solidFill>
-                  <a:prstClr val="black">
-                    <a:lumMod val="75000"/>
-                    <a:lumOff val="25000"/>
-                  </a:prstClr>
-                </a:solidFill>
-              </a:rPr>
-              <a:t>Program</a:t>
-            </a:r>
-            <a:r>
-              <a:rPr lang="de-DE" dirty="0" smtClean="0">
-                <a:solidFill>
-                  <a:prstClr val="black">
-                    <a:lumMod val="75000"/>
-                    <a:lumOff val="25000"/>
-                  </a:prstClr>
-                </a:solidFill>
-              </a:rPr>
-              <a:t> KDSL | Dr. J. </a:t>
-            </a:r>
-            <a:r>
-              <a:rPr lang="de-DE" dirty="0" err="1" smtClean="0">
-                <a:solidFill>
-                  <a:prstClr val="black">
-                    <a:lumMod val="75000"/>
-                    <a:lumOff val="25000"/>
-                  </a:prstClr>
-                </a:solidFill>
-              </a:rPr>
-              <a:t>Eckle</a:t>
-            </a:r>
-            <a:r>
-              <a:rPr lang="de-DE" dirty="0" smtClean="0">
-                <a:solidFill>
-                  <a:prstClr val="black">
-                    <a:lumMod val="75000"/>
-                    <a:lumOff val="25000"/>
-                  </a:prstClr>
-                </a:solidFill>
-              </a:rPr>
-              <a:t>-Kohler, R. Eckart de Castilho, R. Kluge, Dr. T. </a:t>
-            </a:r>
-            <a:r>
-              <a:rPr lang="de-DE" dirty="0" err="1" smtClean="0">
-                <a:solidFill>
-                  <a:prstClr val="black">
-                    <a:lumMod val="75000"/>
-                    <a:lumOff val="25000"/>
-                  </a:prstClr>
-                </a:solidFill>
-              </a:rPr>
-              <a:t>Zesch</a:t>
+              <a:t>29.05.2013 | Dr. J. Eckle-Kohler, R. Eckart de Castilho, R. Kluge, Dr. T. Zesch</a:t>
             </a:r>
             <a:endParaRPr lang="de-DE" dirty="0">
               <a:solidFill>
@@ -6353,7 +6276,7 @@
                   <a:prstClr val="black"/>
                 </a:solidFill>
               </a:rPr>
-              <a:t>29.05.2013 | PhD Program KDSL | Dr. J. Eckle-Kohler, R. Eckart de Castilho, R. Kluge, Dr. T. Zesch</a:t>
+              <a:t>29.05.2013 | Dr. J. Eckle-Kohler, R. Eckart de Castilho, R. Kluge, Dr. T. Zesch</a:t>
             </a:r>
             <a:endParaRPr lang="de-DE" dirty="0">
               <a:solidFill>
@@ -7298,7 +7221,7 @@
                   <a:prstClr val="black"/>
                 </a:solidFill>
               </a:rPr>
-              <a:t>29.05.2013 | PhD Program KDSL | Dr. J. Eckle-Kohler, R. Eckart de Castilho, R. Kluge, Dr. T. Zesch</a:t>
+              <a:t>29.05.2013 | Dr. J. Eckle-Kohler, R. Eckart de Castilho, R. Kluge, Dr. T. Zesch</a:t>
             </a:r>
             <a:endParaRPr lang="de-DE" dirty="0">
               <a:solidFill>
@@ -7436,7 +7359,7 @@
                   <a:prstClr val="black"/>
                 </a:solidFill>
               </a:rPr>
-              <a:t>29.05.2013 | PhD Program KDSL | Dr. J. Eckle-Kohler, R. Eckart de Castilho, R. Kluge, Dr. T. Zesch</a:t>
+              <a:t>29.05.2013 | Dr. J. Eckle-Kohler, R. Eckart de Castilho, R. Kluge, Dr. T. Zesch</a:t>
             </a:r>
             <a:endParaRPr lang="de-DE" dirty="0">
               <a:solidFill>
@@ -7551,7 +7474,7 @@
                   <a:prstClr val="black"/>
                 </a:solidFill>
               </a:rPr>
-              <a:t>29.05.2013 | PhD Program KDSL | Dr. J. Eckle-Kohler, R. Eckart de Castilho, R. Kluge, Dr. T. Zesch</a:t>
+              <a:t>29.05.2013 | Dr. J. Eckle-Kohler, R. Eckart de Castilho, R. Kluge, Dr. T. Zesch</a:t>
             </a:r>
             <a:endParaRPr lang="de-DE" dirty="0">
               <a:solidFill>
@@ -8097,7 +8020,7 @@
                   <a:prstClr val="black"/>
                 </a:solidFill>
               </a:rPr>
-              <a:t>29.05.2013 | PhD Program KDSL | Dr. J. Eckle-Kohler, R. Eckart de Castilho, R. Kluge, Dr. T. Zesch</a:t>
+              <a:t>29.05.2013 | Dr. J. Eckle-Kohler, R. Eckart de Castilho, R. Kluge, Dr. T. Zesch</a:t>
             </a:r>
             <a:endParaRPr lang="de-DE" dirty="0">
               <a:solidFill>
@@ -8415,7 +8338,7 @@
                   <a:prstClr val="black"/>
                 </a:solidFill>
               </a:rPr>
-              <a:t>29.05.2013 | PhD Program KDSL | Dr. J. Eckle-Kohler, R. Eckart de Castilho, R. Kluge, Dr. T. Zesch</a:t>
+              <a:t>29.05.2013 | Dr. J. Eckle-Kohler, R. Eckart de Castilho, R. Kluge, Dr. T. Zesch</a:t>
             </a:r>
             <a:endParaRPr lang="de-DE" dirty="0">
               <a:solidFill>
@@ -9119,7 +9042,7 @@
                   <a:prstClr val="black"/>
                 </a:solidFill>
               </a:rPr>
-              <a:t>29.05.2013 | PhD Program KDSL | Dr. J. Eckle-Kohler, R. Eckart de Castilho, R. Kluge, Dr. T. Zesch</a:t>
+              <a:t>29.05.2013 | Dr. J. Eckle-Kohler, R. Eckart de Castilho, R. Kluge, Dr. T. Zesch</a:t>
             </a:r>
             <a:endParaRPr lang="de-DE" dirty="0">
               <a:solidFill>
@@ -9588,7 +9511,7 @@
                   <a:prstClr val="black"/>
                 </a:solidFill>
               </a:rPr>
-              <a:t>29.05.2013 | PhD Program KDSL | Dr. J. Eckle-Kohler, R. Eckart de Castilho, R. Kluge, Dr. T. Zesch</a:t>
+              <a:t>29.05.2013 | Dr. J. Eckle-Kohler, R. Eckart de Castilho, R. Kluge, Dr. T. Zesch</a:t>
             </a:r>
             <a:endParaRPr lang="de-DE" dirty="0">
               <a:solidFill>
@@ -10319,7 +10242,7 @@
           </a:lstStyle>
           <a:p>
             <a:r>
-              <a:rPr lang="de-DE" dirty="0" smtClean="0">
+              <a:rPr lang="de-DE" smtClean="0">
                 <a:solidFill>
                   <a:prstClr val="black">
                     <a:lumMod val="75000"/>
@@ -10327,84 +10250,7 @@
                   </a:prstClr>
                 </a:solidFill>
               </a:rPr>
-              <a:t>29.05.2013 | </a:t>
-            </a:r>
-            <a:r>
-              <a:rPr lang="de-DE" dirty="0" err="1" smtClean="0">
-                <a:solidFill>
-                  <a:prstClr val="black">
-                    <a:lumMod val="75000"/>
-                    <a:lumOff val="25000"/>
-                  </a:prstClr>
-                </a:solidFill>
-              </a:rPr>
-              <a:t>PhD</a:t>
-            </a:r>
-            <a:r>
-              <a:rPr lang="de-DE" dirty="0" smtClean="0">
-                <a:solidFill>
-                  <a:prstClr val="black">
-                    <a:lumMod val="75000"/>
-                    <a:lumOff val="25000"/>
-                  </a:prstClr>
-                </a:solidFill>
-              </a:rPr>
-              <a:t> </a:t>
-            </a:r>
-            <a:r>
-              <a:rPr lang="de-DE" dirty="0" err="1" smtClean="0">
-                <a:solidFill>
-                  <a:prstClr val="black">
-                    <a:lumMod val="75000"/>
-                    <a:lumOff val="25000"/>
-                  </a:prstClr>
-                </a:solidFill>
-              </a:rPr>
-              <a:t>Program</a:t>
-            </a:r>
-            <a:r>
-              <a:rPr lang="de-DE" dirty="0" smtClean="0">
-                <a:solidFill>
-                  <a:prstClr val="black">
-                    <a:lumMod val="75000"/>
-                    <a:lumOff val="25000"/>
-                  </a:prstClr>
-                </a:solidFill>
-              </a:rPr>
-              <a:t> KDSL | Dr. J. </a:t>
-            </a:r>
-            <a:r>
-              <a:rPr lang="de-DE" dirty="0" err="1" smtClean="0">
-                <a:solidFill>
-                  <a:prstClr val="black">
-                    <a:lumMod val="75000"/>
-                    <a:lumOff val="25000"/>
-                  </a:prstClr>
-                </a:solidFill>
-              </a:rPr>
-              <a:t>Eckle</a:t>
-            </a:r>
-            <a:r>
-              <a:rPr lang="de-DE" dirty="0" smtClean="0">
-                <a:solidFill>
-                  <a:prstClr val="black">
-                    <a:lumMod val="75000"/>
-                    <a:lumOff val="25000"/>
-                  </a:prstClr>
-                </a:solidFill>
-              </a:rPr>
-              <a:t>-Kohler, R. Eckart de Castilho, R. Kluge, Dr. T. </a:t>
-            </a:r>
-            <a:r>
-              <a:rPr lang="de-DE" dirty="0" err="1" smtClean="0">
-                <a:solidFill>
-                  <a:prstClr val="black">
-                    <a:lumMod val="75000"/>
-                    <a:lumOff val="25000"/>
-                  </a:prstClr>
-                </a:solidFill>
-              </a:rPr>
-              <a:t>Zesch</a:t>
+              <a:t>29.05.2013 | Dr. J. Eckle-Kohler, R. Eckart de Castilho, R. Kluge, Dr. T. Zesch</a:t>
             </a:r>
             <a:endParaRPr lang="de-DE" dirty="0">
               <a:solidFill>
@@ -11532,7 +11378,7 @@
                   <a:prstClr val="black"/>
                 </a:solidFill>
               </a:rPr>
-              <a:t>29.05.2013 | PhD Program KDSL | Dr. J. Eckle-Kohler, R. Eckart de Castilho, R. Kluge, Dr. T. Zesch</a:t>
+              <a:t>29.05.2013 | Dr. J. Eckle-Kohler, R. Eckart de Castilho, R. Kluge, Dr. T. Zesch</a:t>
             </a:r>
             <a:endParaRPr lang="de-DE" dirty="0">
               <a:solidFill>
@@ -12477,7 +12323,7 @@
                   <a:prstClr val="black"/>
                 </a:solidFill>
               </a:rPr>
-              <a:t>29.05.2013 | PhD Program KDSL | Dr. J. Eckle-Kohler, R. Eckart de Castilho, R. Kluge, Dr. T. Zesch</a:t>
+              <a:t>29.05.2013 | Dr. J. Eckle-Kohler, R. Eckart de Castilho, R. Kluge, Dr. T. Zesch</a:t>
             </a:r>
             <a:endParaRPr lang="de-DE" dirty="0">
               <a:solidFill>
@@ -12615,7 +12461,7 @@
                   <a:prstClr val="black"/>
                 </a:solidFill>
               </a:rPr>
-              <a:t>29.05.2013 | PhD Program KDSL | Dr. J. Eckle-Kohler, R. Eckart de Castilho, R. Kluge, Dr. T. Zesch</a:t>
+              <a:t>29.05.2013 | Dr. J. Eckle-Kohler, R. Eckart de Castilho, R. Kluge, Dr. T. Zesch</a:t>
             </a:r>
             <a:endParaRPr lang="de-DE" dirty="0">
               <a:solidFill>
@@ -12730,7 +12576,7 @@
                   <a:prstClr val="black"/>
                 </a:solidFill>
               </a:rPr>
-              <a:t>29.05.2013 | PhD Program KDSL | Dr. J. Eckle-Kohler, R. Eckart de Castilho, R. Kluge, Dr. T. Zesch</a:t>
+              <a:t>29.05.2013 | Dr. J. Eckle-Kohler, R. Eckart de Castilho, R. Kluge, Dr. T. Zesch</a:t>
             </a:r>
             <a:endParaRPr lang="de-DE" dirty="0">
               <a:solidFill>
@@ -13185,7 +13031,7 @@
             </a:pPr>
             <a:r>
               <a:rPr lang="de-DE" smtClean="0"/>
-              <a:t>29.05.2013 | PhD Program KDSL | Dr. J. Eckle-Kohler, R. Eckart de Castilho, R. Kluge, Dr. T. Zesch</a:t>
+              <a:t>29.05.2013 | Dr. J. Eckle-Kohler, R. Eckart de Castilho, R. Kluge, Dr. T. Zesch</a:t>
             </a:r>
             <a:endParaRPr lang="de-DE"/>
           </a:p>
@@ -13722,7 +13568,7 @@
                   <a:prstClr val="black"/>
                 </a:solidFill>
               </a:rPr>
-              <a:t>29.05.2013 | PhD Program KDSL | Dr. J. Eckle-Kohler, R. Eckart de Castilho, R. Kluge, Dr. T. Zesch</a:t>
+              <a:t>29.05.2013 | Dr. J. Eckle-Kohler, R. Eckart de Castilho, R. Kluge, Dr. T. Zesch</a:t>
             </a:r>
             <a:endParaRPr lang="de-DE" dirty="0">
               <a:solidFill>
@@ -14040,7 +13886,7 @@
                   <a:prstClr val="black"/>
                 </a:solidFill>
               </a:rPr>
-              <a:t>29.05.2013 | PhD Program KDSL | Dr. J. Eckle-Kohler, R. Eckart de Castilho, R. Kluge, Dr. T. Zesch</a:t>
+              <a:t>29.05.2013 | Dr. J. Eckle-Kohler, R. Eckart de Castilho, R. Kluge, Dr. T. Zesch</a:t>
             </a:r>
             <a:endParaRPr lang="de-DE" dirty="0">
               <a:solidFill>
@@ -14454,7 +14300,7 @@
                   <a:prstClr val="black"/>
                 </a:solidFill>
               </a:rPr>
-              <a:t>29.05.2013 | PhD Program KDSL | Dr. J. Eckle-Kohler, R. Eckart de Castilho, R. Kluge, Dr. T. Zesch</a:t>
+              <a:t>29.05.2013 | Dr. J. Eckle-Kohler, R. Eckart de Castilho, R. Kluge, Dr. T. Zesch</a:t>
             </a:r>
             <a:endParaRPr lang="de-DE" dirty="0">
               <a:solidFill>
@@ -14923,7 +14769,7 @@
                   <a:prstClr val="black"/>
                 </a:solidFill>
               </a:rPr>
-              <a:t>29.05.2013 | PhD Program KDSL | Dr. J. Eckle-Kohler, R. Eckart de Castilho, R. Kluge, Dr. T. Zesch</a:t>
+              <a:t>29.05.2013 | Dr. J. Eckle-Kohler, R. Eckart de Castilho, R. Kluge, Dr. T. Zesch</a:t>
             </a:r>
             <a:endParaRPr lang="de-DE" dirty="0">
               <a:solidFill>
@@ -15745,7 +15591,7 @@
             </a:pPr>
             <a:r>
               <a:rPr lang="de-DE" smtClean="0"/>
-              <a:t>29.05.2013 | PhD Program KDSL | Dr. J. Eckle-Kohler, R. Eckart de Castilho, R. Kluge, Dr. T. Zesch</a:t>
+              <a:t>29.05.2013 | Dr. J. Eckle-Kohler, R. Eckart de Castilho, R. Kluge, Dr. T. Zesch</a:t>
             </a:r>
             <a:endParaRPr lang="de-DE"/>
           </a:p>
@@ -15861,7 +15707,7 @@
             </a:pPr>
             <a:r>
               <a:rPr lang="de-DE" smtClean="0"/>
-              <a:t>29.05.2013 | PhD Program KDSL | Dr. J. Eckle-Kohler, R. Eckart de Castilho, R. Kluge, Dr. T. Zesch</a:t>
+              <a:t>29.05.2013 | Dr. J. Eckle-Kohler, R. Eckart de Castilho, R. Kluge, Dr. T. Zesch</a:t>
             </a:r>
             <a:endParaRPr lang="de-DE"/>
           </a:p>
@@ -15954,7 +15800,7 @@
             </a:pPr>
             <a:r>
               <a:rPr lang="de-DE" smtClean="0"/>
-              <a:t>29.05.2013 | PhD Program KDSL | Dr. J. Eckle-Kohler, R. Eckart de Castilho, R. Kluge, Dr. T. Zesch</a:t>
+              <a:t>29.05.2013 | Dr. J. Eckle-Kohler, R. Eckart de Castilho, R. Kluge, Dr. T. Zesch</a:t>
             </a:r>
             <a:endParaRPr lang="de-DE"/>
           </a:p>
@@ -16316,7 +16162,7 @@
             </a:pPr>
             <a:r>
               <a:rPr lang="de-DE" smtClean="0"/>
-              <a:t>29.05.2013 | PhD Program KDSL | Dr. J. Eckle-Kohler, R. Eckart de Castilho, R. Kluge, Dr. T. Zesch</a:t>
+              <a:t>29.05.2013 | Dr. J. Eckle-Kohler, R. Eckart de Castilho, R. Kluge, Dr. T. Zesch</a:t>
             </a:r>
             <a:endParaRPr lang="de-DE"/>
           </a:p>
@@ -16579,7 +16425,7 @@
             </a:pPr>
             <a:r>
               <a:rPr lang="de-DE" smtClean="0"/>
-              <a:t>29.05.2013 | PhD Program KDSL | Dr. J. Eckle-Kohler, R. Eckart de Castilho, R. Kluge, Dr. T. Zesch</a:t>
+              <a:t>29.05.2013 | Dr. J. Eckle-Kohler, R. Eckart de Castilho, R. Kluge, Dr. T. Zesch</a:t>
             </a:r>
             <a:endParaRPr lang="de-DE"/>
           </a:p>
@@ -16843,7 +16689,7 @@
             </a:pPr>
             <a:r>
               <a:rPr lang="de-DE" smtClean="0"/>
-              <a:t>29.05.2013 | PhD Program KDSL | Dr. J. Eckle-Kohler, R. Eckart de Castilho, R. Kluge, Dr. T. Zesch</a:t>
+              <a:t>29.05.2013 | Dr. J. Eckle-Kohler, R. Eckart de Castilho, R. Kluge, Dr. T. Zesch</a:t>
             </a:r>
             <a:endParaRPr lang="de-DE"/>
           </a:p>
@@ -17042,60 +16888,6 @@
           </a:p>
         </p:txBody>
       </p:sp>
-      <p:pic>
-        <p:nvPicPr>
-          <p:cNvPr id="1028" name="Picture 6" descr="DIPF_WBM_2z_RGB_RZ"/>
-          <p:cNvPicPr>
-            <a:picLocks noChangeAspect="1" noChangeArrowheads="1"/>
-          </p:cNvPicPr>
-          <p:nvPr/>
-        </p:nvPicPr>
-        <p:blipFill>
-          <a:blip r:embed="rId13" cstate="print">
-            <a:extLst>
-              <a:ext uri="{28A0092B-C50C-407E-A947-70E740481C1C}">
-                <a14:useLocalDpi xmlns:a14="http://schemas.microsoft.com/office/drawing/2010/main" val="0"/>
-              </a:ext>
-            </a:extLst>
-          </a:blip>
-          <a:srcRect/>
-          <a:stretch>
-            <a:fillRect/>
-          </a:stretch>
-        </p:blipFill>
-        <p:spPr bwMode="auto">
-          <a:xfrm>
-            <a:off x="6605588" y="0"/>
-            <a:ext cx="1370012" cy="682625"/>
-          </a:xfrm>
-          <a:prstGeom prst="rect">
-            <a:avLst/>
-          </a:prstGeom>
-          <a:noFill/>
-          <a:ln>
-            <a:noFill/>
-          </a:ln>
-          <a:extLst>
-            <a:ext uri="{909E8E84-426E-40DD-AFC4-6F175D3DCCD1}">
-              <a14:hiddenFill xmlns:a14="http://schemas.microsoft.com/office/drawing/2010/main">
-                <a:solidFill>
-                  <a:srgbClr val="FFFFFF"/>
-                </a:solidFill>
-              </a14:hiddenFill>
-            </a:ext>
-            <a:ext uri="{91240B29-F687-4F45-9708-019B960494DF}">
-              <a14:hiddenLine xmlns:a14="http://schemas.microsoft.com/office/drawing/2010/main" w="9525">
-                <a:solidFill>
-                  <a:srgbClr val="000000"/>
-                </a:solidFill>
-                <a:miter lim="800000"/>
-                <a:headEnd/>
-                <a:tailEnd/>
-              </a14:hiddenLine>
-            </a:ext>
-          </a:extLst>
-        </p:spPr>
-      </p:pic>
       <p:sp>
         <p:nvSpPr>
           <p:cNvPr id="1029" name="Rectangle 7"/>
@@ -17316,114 +17108,6 @@
           </a:p>
         </p:txBody>
       </p:sp>
-      <p:pic>
-        <p:nvPicPr>
-          <p:cNvPr id="1031" name="Picture 5"/>
-          <p:cNvPicPr>
-            <a:picLocks noChangeAspect="1" noChangeArrowheads="1"/>
-          </p:cNvPicPr>
-          <p:nvPr/>
-        </p:nvPicPr>
-        <p:blipFill>
-          <a:blip r:embed="rId14">
-            <a:extLst>
-              <a:ext uri="{28A0092B-C50C-407E-A947-70E740481C1C}">
-                <a14:useLocalDpi xmlns:a14="http://schemas.microsoft.com/office/drawing/2010/main" val="0"/>
-              </a:ext>
-            </a:extLst>
-          </a:blip>
-          <a:srcRect/>
-          <a:stretch>
-            <a:fillRect/>
-          </a:stretch>
-        </p:blipFill>
-        <p:spPr bwMode="auto">
-          <a:xfrm>
-            <a:off x="8180388" y="6308725"/>
-            <a:ext cx="900112" cy="441325"/>
-          </a:xfrm>
-          <a:prstGeom prst="rect">
-            <a:avLst/>
-          </a:prstGeom>
-          <a:noFill/>
-          <a:ln>
-            <a:noFill/>
-          </a:ln>
-          <a:extLst>
-            <a:ext uri="{909E8E84-426E-40DD-AFC4-6F175D3DCCD1}">
-              <a14:hiddenFill xmlns:a14="http://schemas.microsoft.com/office/drawing/2010/main">
-                <a:solidFill>
-                  <a:srgbClr val="FFFFFF"/>
-                </a:solidFill>
-              </a14:hiddenFill>
-            </a:ext>
-            <a:ext uri="{91240B29-F687-4F45-9708-019B960494DF}">
-              <a14:hiddenLine xmlns:a14="http://schemas.microsoft.com/office/drawing/2010/main" w="9525">
-                <a:solidFill>
-                  <a:srgbClr val="000000"/>
-                </a:solidFill>
-                <a:miter lim="800000"/>
-                <a:headEnd/>
-                <a:tailEnd/>
-              </a14:hiddenLine>
-            </a:ext>
-          </a:extLst>
-        </p:spPr>
-      </p:pic>
-      <p:pic>
-        <p:nvPicPr>
-          <p:cNvPr id="1032" name="Bild 10" descr="tud_logo"/>
-          <p:cNvPicPr>
-            <a:picLocks noChangeAspect="1"/>
-          </p:cNvPicPr>
-          <p:nvPr/>
-        </p:nvPicPr>
-        <p:blipFill>
-          <a:blip r:embed="rId15" cstate="print">
-            <a:extLst>
-              <a:ext uri="{28A0092B-C50C-407E-A947-70E740481C1C}">
-                <a14:useLocalDpi xmlns:a14="http://schemas.microsoft.com/office/drawing/2010/main" val="0"/>
-              </a:ext>
-            </a:extLst>
-          </a:blip>
-          <a:srcRect/>
-          <a:stretch>
-            <a:fillRect/>
-          </a:stretch>
-        </p:blipFill>
-        <p:spPr bwMode="auto">
-          <a:xfrm>
-            <a:off x="7975600" y="66675"/>
-            <a:ext cx="1168400" cy="468313"/>
-          </a:xfrm>
-          <a:prstGeom prst="rect">
-            <a:avLst/>
-          </a:prstGeom>
-          <a:noFill/>
-          <a:ln>
-            <a:noFill/>
-          </a:ln>
-          <a:extLst>
-            <a:ext uri="{909E8E84-426E-40DD-AFC4-6F175D3DCCD1}">
-              <a14:hiddenFill xmlns:a14="http://schemas.microsoft.com/office/drawing/2010/main">
-                <a:solidFill>
-                  <a:srgbClr val="FFFFFF"/>
-                </a:solidFill>
-              </a14:hiddenFill>
-            </a:ext>
-            <a:ext uri="{91240B29-F687-4F45-9708-019B960494DF}">
-              <a14:hiddenLine xmlns:a14="http://schemas.microsoft.com/office/drawing/2010/main" w="9525">
-                <a:solidFill>
-                  <a:srgbClr val="000000"/>
-                </a:solidFill>
-                <a:miter lim="800000"/>
-                <a:headEnd/>
-                <a:tailEnd/>
-              </a14:hiddenLine>
-            </a:ext>
-          </a:extLst>
-        </p:spPr>
-      </p:pic>
       <p:sp>
         <p:nvSpPr>
           <p:cNvPr id="4" name="Fußzeilenplatzhalter 3"/>
@@ -17460,7 +17144,7 @@
             </a:pPr>
             <a:r>
               <a:rPr lang="de-DE" smtClean="0"/>
-              <a:t>29.05.2013 | PhD Program KDSL | Dr. J. Eckle-Kohler, R. Eckart de Castilho, R. Kluge, Dr. T. Zesch</a:t>
+              <a:t>29.05.2013 | Dr. J. Eckle-Kohler, R. Eckart de Castilho, R. Kluge, Dr. T. Zesch</a:t>
             </a:r>
             <a:endParaRPr lang="de-DE"/>
           </a:p>
@@ -18208,60 +17892,6 @@
           </a:p>
         </p:txBody>
       </p:sp>
-      <p:pic>
-        <p:nvPicPr>
-          <p:cNvPr id="1030" name="Picture 6" descr="DIPF_WBM_2z_RGB_RZ"/>
-          <p:cNvPicPr>
-            <a:picLocks noChangeAspect="1" noChangeArrowheads="1"/>
-          </p:cNvPicPr>
-          <p:nvPr/>
-        </p:nvPicPr>
-        <p:blipFill>
-          <a:blip r:embed="rId14" cstate="print">
-            <a:extLst>
-              <a:ext uri="{28A0092B-C50C-407E-A947-70E740481C1C}">
-                <a14:useLocalDpi xmlns:a14="http://schemas.microsoft.com/office/drawing/2010/main" val="0"/>
-              </a:ext>
-            </a:extLst>
-          </a:blip>
-          <a:srcRect/>
-          <a:stretch>
-            <a:fillRect/>
-          </a:stretch>
-        </p:blipFill>
-        <p:spPr bwMode="auto">
-          <a:xfrm>
-            <a:off x="6606164" y="0"/>
-            <a:ext cx="1368926" cy="683305"/>
-          </a:xfrm>
-          <a:prstGeom prst="rect">
-            <a:avLst/>
-          </a:prstGeom>
-          <a:noFill/>
-          <a:ln>
-            <a:noFill/>
-          </a:ln>
-          <a:extLst>
-            <a:ext uri="{909E8E84-426E-40DD-AFC4-6F175D3DCCD1}">
-              <a14:hiddenFill xmlns:a14="http://schemas.microsoft.com/office/drawing/2010/main">
-                <a:solidFill>
-                  <a:srgbClr val="FFFFFF"/>
-                </a:solidFill>
-              </a14:hiddenFill>
-            </a:ext>
-            <a:ext uri="{91240B29-F687-4F45-9708-019B960494DF}">
-              <a14:hiddenLine xmlns:a14="http://schemas.microsoft.com/office/drawing/2010/main" w="9525">
-                <a:solidFill>
-                  <a:srgbClr val="000000"/>
-                </a:solidFill>
-                <a:miter lim="800000"/>
-                <a:headEnd/>
-                <a:tailEnd/>
-              </a14:hiddenLine>
-            </a:ext>
-          </a:extLst>
-        </p:spPr>
-      </p:pic>
       <p:sp>
         <p:nvSpPr>
           <p:cNvPr id="1031" name="Rectangle 7"/>
@@ -18361,73 +17991,6 @@
           </a:p>
         </p:txBody>
       </p:sp>
-      <p:pic>
-        <p:nvPicPr>
-          <p:cNvPr id="10" name="Picture 5"/>
-          <p:cNvPicPr>
-            <a:picLocks noChangeAspect="1" noChangeArrowheads="1"/>
-          </p:cNvPicPr>
-          <p:nvPr/>
-        </p:nvPicPr>
-        <p:blipFill>
-          <a:blip r:embed="rId15" cstate="print"/>
-          <a:srcRect/>
-          <a:stretch>
-            <a:fillRect/>
-          </a:stretch>
-        </p:blipFill>
-        <p:spPr bwMode="auto">
-          <a:xfrm>
-            <a:off x="8179613" y="6309320"/>
-            <a:ext cx="900100" cy="440159"/>
-          </a:xfrm>
-          <a:prstGeom prst="rect">
-            <a:avLst/>
-          </a:prstGeom>
-          <a:noFill/>
-          <a:ln w="9525">
-            <a:noFill/>
-            <a:miter lim="800000"/>
-            <a:headEnd/>
-            <a:tailEnd/>
-          </a:ln>
-        </p:spPr>
-      </p:pic>
-      <p:pic>
-        <p:nvPicPr>
-          <p:cNvPr id="11" name="Bild 10" descr="tud_logo"/>
-          <p:cNvPicPr>
-            <a:picLocks noChangeAspect="1"/>
-          </p:cNvPicPr>
-          <p:nvPr/>
-        </p:nvPicPr>
-        <p:blipFill>
-          <a:blip r:embed="rId16" cstate="print">
-            <a:extLst>
-              <a:ext uri="{28A0092B-C50C-407E-A947-70E740481C1C}">
-                <a14:useLocalDpi xmlns:a14="http://schemas.microsoft.com/office/drawing/2010/main" val="0"/>
-              </a:ext>
-            </a:extLst>
-          </a:blip>
-          <a:srcRect/>
-          <a:stretch>
-            <a:fillRect/>
-          </a:stretch>
-        </p:blipFill>
-        <p:spPr bwMode="auto">
-          <a:xfrm>
-            <a:off x="7975090" y="67461"/>
-            <a:ext cx="1168910" cy="467564"/>
-          </a:xfrm>
-          <a:prstGeom prst="rect">
-            <a:avLst/>
-          </a:prstGeom>
-          <a:noFill/>
-          <a:ln>
-            <a:noFill/>
-          </a:ln>
-        </p:spPr>
-      </p:pic>
       <p:sp>
         <p:nvSpPr>
           <p:cNvPr id="4" name="Fußzeilenplatzhalter 3"/>
@@ -18465,7 +18028,7 @@
                   <a:prstClr val="black"/>
                 </a:solidFill>
               </a:rPr>
-              <a:t>29.05.2013 | PhD Program KDSL | Dr. J. Eckle-Kohler, R. Eckart de Castilho, R. Kluge, Dr. T. Zesch</a:t>
+              <a:t>29.05.2013 | Dr. J. Eckle-Kohler, R. Eckart de Castilho, R. Kluge, Dr. T. Zesch</a:t>
             </a:r>
             <a:endParaRPr lang="de-DE" dirty="0">
               <a:solidFill>
@@ -19233,60 +18796,6 @@
           </a:p>
         </p:txBody>
       </p:sp>
-      <p:pic>
-        <p:nvPicPr>
-          <p:cNvPr id="1030" name="Picture 6" descr="DIPF_WBM_2z_RGB_RZ"/>
-          <p:cNvPicPr>
-            <a:picLocks noChangeAspect="1" noChangeArrowheads="1"/>
-          </p:cNvPicPr>
-          <p:nvPr/>
-        </p:nvPicPr>
-        <p:blipFill>
-          <a:blip r:embed="rId14" cstate="print">
-            <a:extLst>
-              <a:ext uri="{28A0092B-C50C-407E-A947-70E740481C1C}">
-                <a14:useLocalDpi xmlns:a14="http://schemas.microsoft.com/office/drawing/2010/main" val="0"/>
-              </a:ext>
-            </a:extLst>
-          </a:blip>
-          <a:srcRect/>
-          <a:stretch>
-            <a:fillRect/>
-          </a:stretch>
-        </p:blipFill>
-        <p:spPr bwMode="auto">
-          <a:xfrm>
-            <a:off x="6606164" y="0"/>
-            <a:ext cx="1368926" cy="683305"/>
-          </a:xfrm>
-          <a:prstGeom prst="rect">
-            <a:avLst/>
-          </a:prstGeom>
-          <a:noFill/>
-          <a:ln>
-            <a:noFill/>
-          </a:ln>
-          <a:extLst>
-            <a:ext uri="{909E8E84-426E-40DD-AFC4-6F175D3DCCD1}">
-              <a14:hiddenFill xmlns:a14="http://schemas.microsoft.com/office/drawing/2010/main">
-                <a:solidFill>
-                  <a:srgbClr val="FFFFFF"/>
-                </a:solidFill>
-              </a14:hiddenFill>
-            </a:ext>
-            <a:ext uri="{91240B29-F687-4F45-9708-019B960494DF}">
-              <a14:hiddenLine xmlns:a14="http://schemas.microsoft.com/office/drawing/2010/main" w="9525">
-                <a:solidFill>
-                  <a:srgbClr val="000000"/>
-                </a:solidFill>
-                <a:miter lim="800000"/>
-                <a:headEnd/>
-                <a:tailEnd/>
-              </a14:hiddenLine>
-            </a:ext>
-          </a:extLst>
-        </p:spPr>
-      </p:pic>
       <p:sp>
         <p:nvSpPr>
           <p:cNvPr id="1031" name="Rectangle 7"/>
@@ -19386,73 +18895,6 @@
           </a:p>
         </p:txBody>
       </p:sp>
-      <p:pic>
-        <p:nvPicPr>
-          <p:cNvPr id="10" name="Picture 5"/>
-          <p:cNvPicPr>
-            <a:picLocks noChangeAspect="1" noChangeArrowheads="1"/>
-          </p:cNvPicPr>
-          <p:nvPr/>
-        </p:nvPicPr>
-        <p:blipFill>
-          <a:blip r:embed="rId15" cstate="print"/>
-          <a:srcRect/>
-          <a:stretch>
-            <a:fillRect/>
-          </a:stretch>
-        </p:blipFill>
-        <p:spPr bwMode="auto">
-          <a:xfrm>
-            <a:off x="8179613" y="6309320"/>
-            <a:ext cx="900100" cy="440159"/>
-          </a:xfrm>
-          <a:prstGeom prst="rect">
-            <a:avLst/>
-          </a:prstGeom>
-          <a:noFill/>
-          <a:ln w="9525">
-            <a:noFill/>
-            <a:miter lim="800000"/>
-            <a:headEnd/>
-            <a:tailEnd/>
-          </a:ln>
-        </p:spPr>
-      </p:pic>
-      <p:pic>
-        <p:nvPicPr>
-          <p:cNvPr id="11" name="Bild 10" descr="tud_logo"/>
-          <p:cNvPicPr>
-            <a:picLocks noChangeAspect="1"/>
-          </p:cNvPicPr>
-          <p:nvPr/>
-        </p:nvPicPr>
-        <p:blipFill>
-          <a:blip r:embed="rId16" cstate="print">
-            <a:extLst>
-              <a:ext uri="{28A0092B-C50C-407E-A947-70E740481C1C}">
-                <a14:useLocalDpi xmlns:a14="http://schemas.microsoft.com/office/drawing/2010/main" val="0"/>
-              </a:ext>
-            </a:extLst>
-          </a:blip>
-          <a:srcRect/>
-          <a:stretch>
-            <a:fillRect/>
-          </a:stretch>
-        </p:blipFill>
-        <p:spPr bwMode="auto">
-          <a:xfrm>
-            <a:off x="7975090" y="67461"/>
-            <a:ext cx="1168910" cy="467564"/>
-          </a:xfrm>
-          <a:prstGeom prst="rect">
-            <a:avLst/>
-          </a:prstGeom>
-          <a:noFill/>
-          <a:ln>
-            <a:noFill/>
-          </a:ln>
-        </p:spPr>
-      </p:pic>
       <p:sp>
         <p:nvSpPr>
           <p:cNvPr id="4" name="Fußzeilenplatzhalter 3"/>
@@ -19490,7 +18932,7 @@
                   <a:prstClr val="black"/>
                 </a:solidFill>
               </a:rPr>
-              <a:t>29.05.2013 | PhD Program KDSL | Dr. J. Eckle-Kohler, R. Eckart de Castilho, R. Kluge, Dr. T. Zesch</a:t>
+              <a:t>29.05.2013 | Dr. J. Eckle-Kohler, R. Eckart de Castilho, R. Kluge, Dr. T. Zesch</a:t>
             </a:r>
             <a:endParaRPr lang="de-DE" dirty="0">
               <a:solidFill>
@@ -20115,6 +19557,36 @@
           </a:p>
         </p:txBody>
       </p:sp>
+      <p:pic>
+        <p:nvPicPr>
+          <p:cNvPr id="2" name="Grafik 1"/>
+          <p:cNvPicPr>
+            <a:picLocks noChangeAspect="1"/>
+          </p:cNvPicPr>
+          <p:nvPr/>
+        </p:nvPicPr>
+        <p:blipFill>
+          <a:blip r:embed="rId2">
+            <a:extLst>
+              <a:ext uri="{28A0092B-C50C-407E-A947-70E740481C1C}">
+                <a14:useLocalDpi xmlns:a14="http://schemas.microsoft.com/office/drawing/2010/main" val="0"/>
+              </a:ext>
+            </a:extLst>
+          </a:blip>
+          <a:stretch>
+            <a:fillRect/>
+          </a:stretch>
+        </p:blipFill>
+        <p:spPr>
+          <a:xfrm>
+            <a:off x="683568" y="6093296"/>
+            <a:ext cx="1117460" cy="393651"/>
+          </a:xfrm>
+          <a:prstGeom prst="rect">
+            <a:avLst/>
+          </a:prstGeom>
+        </p:spPr>
+      </p:pic>
     </p:spTree>
   </p:cSld>
   <p:clrMapOvr>
@@ -20508,7 +19980,7 @@
             </a:pPr>
             <a:r>
               <a:rPr lang="de-DE" smtClean="0"/>
-              <a:t>29.05.2013 | PhD Program KDSL | Dr. J. Eckle-Kohler, R. Eckart de Castilho, R. Kluge, Dr. T. Zesch</a:t>
+              <a:t>29.05.2013 | Dr. J. Eckle-Kohler, R. Eckart de Castilho, R. Kluge, Dr. T. Zesch</a:t>
             </a:r>
             <a:endParaRPr lang="de-DE"/>
           </a:p>
@@ -20864,7 +20336,7 @@
             </a:pPr>
             <a:r>
               <a:rPr lang="de-DE" smtClean="0"/>
-              <a:t>29.05.2013 | PhD Program KDSL | Dr. J. Eckle-Kohler, R. Eckart de Castilho, R. Kluge, Dr. T. Zesch</a:t>
+              <a:t>29.05.2013 | Dr. J. Eckle-Kohler, R. Eckart de Castilho, R. Kluge, Dr. T. Zesch</a:t>
             </a:r>
             <a:endParaRPr lang="de-DE"/>
           </a:p>
@@ -20949,7 +20421,7 @@
           <a:p>
             <a:r>
               <a:rPr lang="de-DE" smtClean="0"/>
-              <a:t>29.05.2013 | PhD Program KDSL | Dr. J. Eckle-Kohler, R. Eckart de Castilho, R. Kluge, Dr. T. Zesch</a:t>
+              <a:t>29.05.2013 | Dr. J. Eckle-Kohler, R. Eckart de Castilho, R. Kluge, Dr. T. Zesch</a:t>
             </a:r>
             <a:endParaRPr lang="de-DE" dirty="0"/>
           </a:p>
@@ -21004,11 +20476,7 @@
           <a:p>
             <a:r>
               <a:rPr lang="de-DE" sz="3600" b="1" dirty="0" smtClean="0"/>
-              <a:t>Part </a:t>
-            </a:r>
-            <a:r>
-              <a:rPr lang="de-DE" sz="3600" b="1" dirty="0" smtClean="0"/>
-              <a:t>2: </a:t>
+              <a:t>Part 2: </a:t>
             </a:r>
             <a:r>
               <a:rPr lang="de-DE" sz="3600" b="1" dirty="0" err="1"/>
@@ -21283,7 +20751,7 @@
             </a:pPr>
             <a:r>
               <a:rPr lang="de-DE" smtClean="0"/>
-              <a:t>29.05.2013 | PhD Program KDSL | Dr. J. Eckle-Kohler, R. Eckart de Castilho, R. Kluge, Dr. T. Zesch</a:t>
+              <a:t>29.05.2013 | Dr. J. Eckle-Kohler, R. Eckart de Castilho, R. Kluge, Dr. T. Zesch</a:t>
             </a:r>
             <a:endParaRPr lang="de-DE"/>
           </a:p>
@@ -21651,7 +21119,7 @@
             </a:pPr>
             <a:r>
               <a:rPr lang="de-DE" smtClean="0"/>
-              <a:t>29.05.2013 | PhD Program KDSL | Dr. J. Eckle-Kohler, R. Eckart de Castilho, R. Kluge, Dr. T. Zesch</a:t>
+              <a:t>29.05.2013 | Dr. J. Eckle-Kohler, R. Eckart de Castilho, R. Kluge, Dr. T. Zesch</a:t>
             </a:r>
             <a:endParaRPr lang="de-DE"/>
           </a:p>
@@ -21923,7 +21391,7 @@
             </a:pPr>
             <a:r>
               <a:rPr lang="de-DE" smtClean="0"/>
-              <a:t>29.05.2013 | PhD Program KDSL | Dr. J. Eckle-Kohler, R. Eckart de Castilho, R. Kluge, Dr. T. Zesch</a:t>
+              <a:t>29.05.2013 | Dr. J. Eckle-Kohler, R. Eckart de Castilho, R. Kluge, Dr. T. Zesch</a:t>
             </a:r>
             <a:endParaRPr lang="de-DE"/>
           </a:p>
@@ -22246,7 +21714,7 @@
             </a:pPr>
             <a:r>
               <a:rPr lang="de-DE" smtClean="0"/>
-              <a:t>29.05.2013 | PhD Program KDSL | Dr. J. Eckle-Kohler, R. Eckart de Castilho, R. Kluge, Dr. T. Zesch</a:t>
+              <a:t>29.05.2013 | Dr. J. Eckle-Kohler, R. Eckart de Castilho, R. Kluge, Dr. T. Zesch</a:t>
             </a:r>
             <a:endParaRPr lang="de-DE"/>
           </a:p>
@@ -22687,7 +22155,7 @@
             </a:pPr>
             <a:r>
               <a:rPr lang="de-DE" smtClean="0"/>
-              <a:t>29.05.2013 | PhD Program KDSL | Dr. J. Eckle-Kohler, R. Eckart de Castilho, R. Kluge, Dr. T. Zesch</a:t>
+              <a:t>29.05.2013 | Dr. J. Eckle-Kohler, R. Eckart de Castilho, R. Kluge, Dr. T. Zesch</a:t>
             </a:r>
             <a:endParaRPr lang="de-DE"/>
           </a:p>
@@ -22821,11 +22289,7 @@
           <a:p>
             <a:r>
               <a:rPr lang="en-US" dirty="0" smtClean="0"/>
-              <a:t>Sequence tagging model trained on a manually annotated </a:t>
-            </a:r>
-            <a:r>
-              <a:rPr lang="en-US" dirty="0" smtClean="0"/>
-              <a:t>corpus</a:t>
+              <a:t>Sequence tagging model trained on a manually annotated corpus</a:t>
             </a:r>
           </a:p>
           <a:p>
@@ -22842,7 +22306,6 @@
               <a:rPr lang="en-US" dirty="0" smtClean="0"/>
               <a:t> that has been used to tokenize the training corpus for the tagger component</a:t>
             </a:r>
-            <a:endParaRPr lang="en-US" dirty="0" smtClean="0"/>
           </a:p>
           <a:p>
             <a:r>
@@ -22918,7 +22381,7 @@
             </a:pPr>
             <a:r>
               <a:rPr lang="de-DE" smtClean="0"/>
-              <a:t>29.05.2013 | PhD Program KDSL | Dr. J. Eckle-Kohler, R. Eckart de Castilho, R. Kluge, Dr. T. Zesch</a:t>
+              <a:t>29.05.2013 | Dr. J. Eckle-Kohler, R. Eckart de Castilho, R. Kluge, Dr. T. Zesch</a:t>
             </a:r>
             <a:endParaRPr lang="de-DE"/>
           </a:p>
@@ -23218,7 +22681,7 @@
             </a:pPr>
             <a:r>
               <a:rPr lang="de-DE" smtClean="0"/>
-              <a:t>29.05.2013 | PhD Program KDSL | Dr. J. Eckle-Kohler, R. Eckart de Castilho, R. Kluge, Dr. T. Zesch</a:t>
+              <a:t>29.05.2013 | Dr. J. Eckle-Kohler, R. Eckart de Castilho, R. Kluge, Dr. T. Zesch</a:t>
             </a:r>
             <a:endParaRPr lang="de-DE"/>
           </a:p>
@@ -23303,7 +22766,7 @@
           <a:p>
             <a:r>
               <a:rPr lang="de-DE" smtClean="0"/>
-              <a:t>29.05.2013 | PhD Program KDSL | Dr. J. Eckle-Kohler, R. Eckart de Castilho, R. Kluge, Dr. T. Zesch</a:t>
+              <a:t>29.05.2013 | Dr. J. Eckle-Kohler, R. Eckart de Castilho, R. Kluge, Dr. T. Zesch</a:t>
             </a:r>
             <a:endParaRPr lang="de-DE" dirty="0"/>
           </a:p>
@@ -23358,11 +22821,7 @@
           <a:p>
             <a:r>
               <a:rPr lang="de-DE" sz="3600" b="1" dirty="0" smtClean="0"/>
-              <a:t>Part 1: </a:t>
-            </a:r>
-            <a:r>
-              <a:rPr lang="de-DE" sz="3600" b="1" dirty="0" smtClean="0"/>
-              <a:t>Tools in </a:t>
+              <a:t>Part 1: Tools in </a:t>
             </a:r>
             <a:r>
               <a:rPr lang="de-DE" sz="3600" b="1" dirty="0" err="1" smtClean="0"/>
@@ -23544,7 +23003,7 @@
             </a:pPr>
             <a:r>
               <a:rPr lang="de-DE" smtClean="0"/>
-              <a:t>29.05.2013 | PhD Program KDSL | Dr. J. Eckle-Kohler, R. Eckart de Castilho, R. Kluge, Dr. T. Zesch</a:t>
+              <a:t>29.05.2013 | Dr. J. Eckle-Kohler, R. Eckart de Castilho, R. Kluge, Dr. T. Zesch</a:t>
             </a:r>
             <a:endParaRPr lang="de-DE"/>
           </a:p>
@@ -24499,7 +23958,7 @@
             </a:pPr>
             <a:r>
               <a:rPr lang="de-DE" smtClean="0"/>
-              <a:t>29.05.2013 | PhD Program KDSL | Dr. J. Eckle-Kohler, R. Eckart de Castilho, R. Kluge, Dr. T. Zesch</a:t>
+              <a:t>29.05.2013 | Dr. J. Eckle-Kohler, R. Eckart de Castilho, R. Kluge, Dr. T. Zesch</a:t>
             </a:r>
             <a:endParaRPr lang="de-DE"/>
           </a:p>
@@ -24873,7 +24332,7 @@
             </a:pPr>
             <a:r>
               <a:rPr lang="de-DE" smtClean="0"/>
-              <a:t>29.05.2013 | PhD Program KDSL | Dr. J. Eckle-Kohler, R. Eckart de Castilho, R. Kluge, Dr. T. Zesch</a:t>
+              <a:t>29.05.2013 | Dr. J. Eckle-Kohler, R. Eckart de Castilho, R. Kluge, Dr. T. Zesch</a:t>
             </a:r>
             <a:endParaRPr lang="de-DE"/>
           </a:p>
@@ -25699,7 +25158,7 @@
             </a:pPr>
             <a:r>
               <a:rPr lang="de-DE" smtClean="0"/>
-              <a:t>29.05.2013 | PhD Program KDSL | Dr. J. Eckle-Kohler, R. Eckart de Castilho, R. Kluge, Dr. T. Zesch</a:t>
+              <a:t>29.05.2013 | Dr. J. Eckle-Kohler, R. Eckart de Castilho, R. Kluge, Dr. T. Zesch</a:t>
             </a:r>
             <a:endParaRPr lang="de-DE"/>
           </a:p>
@@ -25897,7 +25356,7 @@
             </a:pPr>
             <a:r>
               <a:rPr lang="de-DE" smtClean="0"/>
-              <a:t>29.05.2013 | PhD Program KDSL | Dr. J. Eckle-Kohler, R. Eckart de Castilho, R. Kluge, Dr. T. Zesch</a:t>
+              <a:t>29.05.2013 | Dr. J. Eckle-Kohler, R. Eckart de Castilho, R. Kluge, Dr. T. Zesch</a:t>
             </a:r>
             <a:endParaRPr lang="de-DE"/>
           </a:p>
@@ -26625,7 +26084,7 @@
             </a:pPr>
             <a:r>
               <a:rPr lang="de-DE" smtClean="0"/>
-              <a:t>29.05.2013 | PhD Program KDSL | Dr. J. Eckle-Kohler, R. Eckart de Castilho, R. Kluge, Dr. T. Zesch</a:t>
+              <a:t>29.05.2013 | Dr. J. Eckle-Kohler, R. Eckart de Castilho, R. Kluge, Dr. T. Zesch</a:t>
             </a:r>
             <a:endParaRPr lang="de-DE"/>
           </a:p>
@@ -26763,23 +26222,14 @@
             </a:r>
             <a:r>
               <a:rPr lang="en-US" dirty="0" smtClean="0"/>
-              <a:t>-Core pipelines</a:t>
-            </a:r>
+              <a:t>-Core pipelines)?</a:t>
+            </a:r>
+          </a:p>
+          <a:p>
             <a:r>
               <a:rPr lang="en-US" dirty="0" smtClean="0"/>
-              <a:t>)?</a:t>
-            </a:r>
-          </a:p>
-          <a:p>
-            <a:r>
-              <a:rPr lang="en-US" dirty="0" smtClean="0"/>
-              <a:t>How to add models (e.g. tagger models, parser models) to your project?</a:t>
-            </a:r>
-            <a:r>
-              <a:rPr lang="en-US" dirty="0" smtClean="0"/>
-              <a:t> </a:t>
-            </a:r>
-            <a:endParaRPr lang="en-US" dirty="0" smtClean="0"/>
+              <a:t>How to add models (e.g. tagger models, parser models) to your project? </a:t>
+            </a:r>
           </a:p>
           <a:p>
             <a:r>
@@ -26854,7 +26304,7 @@
             </a:pPr>
             <a:r>
               <a:rPr lang="de-DE" smtClean="0"/>
-              <a:t>29.05.2013 | PhD Program KDSL | Dr. J. Eckle-Kohler, R. Eckart de Castilho, R. Kluge, Dr. T. Zesch</a:t>
+              <a:t>29.05.2013 | Dr. J. Eckle-Kohler, R. Eckart de Castilho, R. Kluge, Dr. T. Zesch</a:t>
             </a:r>
             <a:endParaRPr lang="de-DE"/>
           </a:p>
@@ -27036,7 +26486,7 @@
             </a:pPr>
             <a:r>
               <a:rPr lang="de-DE" smtClean="0"/>
-              <a:t>29.05.2013 | PhD Program KDSL | Dr. J. Eckle-Kohler, R. Eckart de Castilho, R. Kluge, Dr. T. Zesch</a:t>
+              <a:t>29.05.2013 | Dr. J. Eckle-Kohler, R. Eckart de Castilho, R. Kluge, Dr. T. Zesch</a:t>
             </a:r>
             <a:endParaRPr lang="de-DE"/>
           </a:p>
@@ -27219,10 +26669,6 @@
               </a:rPr>
               <a:t>/main/resources</a:t>
             </a:r>
-            <a:endParaRPr lang="en-US" dirty="0" smtClean="0">
-              <a:latin typeface="Courier New" pitchFamily="49" charset="0"/>
-              <a:cs typeface="Courier New" pitchFamily="49" charset="0"/>
-            </a:endParaRPr>
           </a:p>
           <a:p>
             <a:pPr lvl="1"/>
@@ -27253,7 +26699,7 @@
             </a:pPr>
             <a:r>
               <a:rPr lang="de-DE" smtClean="0"/>
-              <a:t>29.05.2013 | PhD Program KDSL | Dr. J. Eckle-Kohler, R. Eckart de Castilho, R. Kluge, Dr. T. Zesch</a:t>
+              <a:t>29.05.2013 | Dr. J. Eckle-Kohler, R. Eckart de Castilho, R. Kluge, Dr. T. Zesch</a:t>
             </a:r>
             <a:endParaRPr lang="de-DE"/>
           </a:p>
@@ -27404,7 +26850,7 @@
             </a:pPr>
             <a:r>
               <a:rPr lang="de-DE" smtClean="0"/>
-              <a:t>29.05.2013 | PhD Program KDSL | Dr. J. Eckle-Kohler, R. Eckart de Castilho, R. Kluge, Dr. T. Zesch</a:t>
+              <a:t>29.05.2013 | Dr. J. Eckle-Kohler, R. Eckart de Castilho, R. Kluge, Dr. T. Zesch</a:t>
             </a:r>
             <a:endParaRPr lang="de-DE"/>
           </a:p>
@@ -27865,7 +27311,7 @@
                   </a:prstClr>
                 </a:solidFill>
               </a:rPr>
-              <a:t>29.05.2013 | PhD Program KDSL | Dr. J. Eckle-Kohler, R. Eckart de Castilho, R. Kluge, Dr. T. Zesch</a:t>
+              <a:t>29.05.2013 | Dr. J. Eckle-Kohler, R. Eckart de Castilho, R. Kluge, Dr. T. Zesch</a:t>
             </a:r>
             <a:endParaRPr lang="de-DE" dirty="0">
               <a:solidFill>
@@ -28805,7 +28251,7 @@
                   </a:prstClr>
                 </a:solidFill>
               </a:rPr>
-              <a:t>29.05.2013 | PhD Program KDSL | Dr. J. Eckle-Kohler, R. Eckart de Castilho, R. Kluge, Dr. T. Zesch</a:t>
+              <a:t>29.05.2013 | Dr. J. Eckle-Kohler, R. Eckart de Castilho, R. Kluge, Dr. T. Zesch</a:t>
             </a:r>
             <a:endParaRPr lang="de-DE" dirty="0">
               <a:solidFill>
@@ -29423,7 +28869,7 @@
             </a:pPr>
             <a:r>
               <a:rPr lang="de-DE" smtClean="0"/>
-              <a:t>29.05.2013 | PhD Program KDSL | Dr. J. Eckle-Kohler, R. Eckart de Castilho, R. Kluge, Dr. T. Zesch</a:t>
+              <a:t>29.05.2013 | Dr. J. Eckle-Kohler, R. Eckart de Castilho, R. Kluge, Dr. T. Zesch</a:t>
             </a:r>
             <a:endParaRPr lang="de-DE"/>
           </a:p>
@@ -30344,7 +29790,7 @@
             </a:pPr>
             <a:r>
               <a:rPr lang="de-DE" smtClean="0"/>
-              <a:t>29.05.2013 | PhD Program KDSL | Dr. J. Eckle-Kohler, R. Eckart de Castilho, R. Kluge, Dr. T. Zesch</a:t>
+              <a:t>29.05.2013 | Dr. J. Eckle-Kohler, R. Eckart de Castilho, R. Kluge, Dr. T. Zesch</a:t>
             </a:r>
             <a:endParaRPr lang="de-DE"/>
           </a:p>
@@ -30907,7 +30353,7 @@
             </a:pPr>
             <a:r>
               <a:rPr lang="de-DE" smtClean="0"/>
-              <a:t>29.05.2013 | PhD Program KDSL | Dr. J. Eckle-Kohler, R. Eckart de Castilho, R. Kluge, Dr. T. Zesch</a:t>
+              <a:t>29.05.2013 | Dr. J. Eckle-Kohler, R. Eckart de Castilho, R. Kluge, Dr. T. Zesch</a:t>
             </a:r>
             <a:endParaRPr lang="de-DE"/>
           </a:p>
@@ -31601,7 +31047,7 @@
             </a:pPr>
             <a:r>
               <a:rPr lang="de-DE" smtClean="0"/>
-              <a:t>29.05.2013 | PhD Program KDSL | Dr. J. Eckle-Kohler, R. Eckart de Castilho, R. Kluge, Dr. T. Zesch</a:t>
+              <a:t>29.05.2013 | Dr. J. Eckle-Kohler, R. Eckart de Castilho, R. Kluge, Dr. T. Zesch</a:t>
             </a:r>
             <a:endParaRPr lang="de-DE"/>
           </a:p>
@@ -31877,7 +31323,7 @@
             </a:pPr>
             <a:r>
               <a:rPr lang="de-DE" smtClean="0"/>
-              <a:t>29.05.2013 | PhD Program KDSL | Dr. J. Eckle-Kohler, R. Eckart de Castilho, R. Kluge, Dr. T. Zesch</a:t>
+              <a:t>29.05.2013 | Dr. J. Eckle-Kohler, R. Eckart de Castilho, R. Kluge, Dr. T. Zesch</a:t>
             </a:r>
             <a:endParaRPr lang="de-DE"/>
           </a:p>

</xml_diff>